<commit_message>
Update LCD Display iInterfacing.pptx
</commit_message>
<xml_diff>
--- a/Documentation/LCD Display iInterfacing.pptx
+++ b/Documentation/LCD Display iInterfacing.pptx
@@ -143,6 +143,11 @@
       </a:defRPr>
     </a:lvl9pPr>
   </p:defaultTextStyle>
+  <p:extLst>
+    <p:ext uri="{EFAFB233-063F-42B5-8137-9DF3F51BA10A}">
+      <p15:sldGuideLst xmlns:p15="http://schemas.microsoft.com/office/powerpoint/2012/main"/>
+    </p:ext>
+  </p:extLst>
 </p:presentation>
 </file>
 
@@ -888,7 +893,7 @@
           <a:p>
             <a:fld id="{D06547AA-0C30-44EA-B66D-6D875D43B7DD}" type="datetimeFigureOut">
               <a:rPr lang="en-CA" smtClean="0"/>
-              <a:t>2021-06-27</a:t>
+              <a:t>2021-06-28</a:t>
             </a:fld>
             <a:endParaRPr lang="en-CA"/>
           </a:p>
@@ -1058,7 +1063,7 @@
           <a:p>
             <a:fld id="{D06547AA-0C30-44EA-B66D-6D875D43B7DD}" type="datetimeFigureOut">
               <a:rPr lang="en-CA" smtClean="0"/>
-              <a:t>2021-06-27</a:t>
+              <a:t>2021-06-28</a:t>
             </a:fld>
             <a:endParaRPr lang="en-CA"/>
           </a:p>
@@ -1238,7 +1243,7 @@
           <a:p>
             <a:fld id="{D06547AA-0C30-44EA-B66D-6D875D43B7DD}" type="datetimeFigureOut">
               <a:rPr lang="en-CA" smtClean="0"/>
-              <a:t>2021-06-27</a:t>
+              <a:t>2021-06-28</a:t>
             </a:fld>
             <a:endParaRPr lang="en-CA"/>
           </a:p>
@@ -1408,7 +1413,7 @@
           <a:p>
             <a:fld id="{D06547AA-0C30-44EA-B66D-6D875D43B7DD}" type="datetimeFigureOut">
               <a:rPr lang="en-CA" smtClean="0"/>
-              <a:t>2021-06-27</a:t>
+              <a:t>2021-06-28</a:t>
             </a:fld>
             <a:endParaRPr lang="en-CA"/>
           </a:p>
@@ -1666,7 +1671,7 @@
           <a:p>
             <a:fld id="{D06547AA-0C30-44EA-B66D-6D875D43B7DD}" type="datetimeFigureOut">
               <a:rPr lang="en-CA" smtClean="0"/>
-              <a:t>2021-06-27</a:t>
+              <a:t>2021-06-28</a:t>
             </a:fld>
             <a:endParaRPr lang="en-CA"/>
           </a:p>
@@ -1954,7 +1959,7 @@
           <a:p>
             <a:fld id="{D06547AA-0C30-44EA-B66D-6D875D43B7DD}" type="datetimeFigureOut">
               <a:rPr lang="en-CA" smtClean="0"/>
-              <a:t>2021-06-27</a:t>
+              <a:t>2021-06-28</a:t>
             </a:fld>
             <a:endParaRPr lang="en-CA"/>
           </a:p>
@@ -2396,7 +2401,7 @@
           <a:p>
             <a:fld id="{D06547AA-0C30-44EA-B66D-6D875D43B7DD}" type="datetimeFigureOut">
               <a:rPr lang="en-CA" smtClean="0"/>
-              <a:t>2021-06-27</a:t>
+              <a:t>2021-06-28</a:t>
             </a:fld>
             <a:endParaRPr lang="en-CA"/>
           </a:p>
@@ -2514,7 +2519,7 @@
           <a:p>
             <a:fld id="{D06547AA-0C30-44EA-B66D-6D875D43B7DD}" type="datetimeFigureOut">
               <a:rPr lang="en-CA" smtClean="0"/>
-              <a:t>2021-06-27</a:t>
+              <a:t>2021-06-28</a:t>
             </a:fld>
             <a:endParaRPr lang="en-CA"/>
           </a:p>
@@ -2609,7 +2614,7 @@
           <a:p>
             <a:fld id="{D06547AA-0C30-44EA-B66D-6D875D43B7DD}" type="datetimeFigureOut">
               <a:rPr lang="en-CA" smtClean="0"/>
-              <a:t>2021-06-27</a:t>
+              <a:t>2021-06-28</a:t>
             </a:fld>
             <a:endParaRPr lang="en-CA"/>
           </a:p>
@@ -2897,7 +2902,7 @@
           <a:p>
             <a:fld id="{D06547AA-0C30-44EA-B66D-6D875D43B7DD}" type="datetimeFigureOut">
               <a:rPr lang="en-CA" smtClean="0"/>
-              <a:t>2021-06-27</a:t>
+              <a:t>2021-06-28</a:t>
             </a:fld>
             <a:endParaRPr lang="en-CA"/>
           </a:p>
@@ -3170,7 +3175,7 @@
           <a:p>
             <a:fld id="{D06547AA-0C30-44EA-B66D-6D875D43B7DD}" type="datetimeFigureOut">
               <a:rPr lang="en-CA" smtClean="0"/>
-              <a:t>2021-06-27</a:t>
+              <a:t>2021-06-28</a:t>
             </a:fld>
             <a:endParaRPr lang="en-CA"/>
           </a:p>
@@ -3467,7 +3472,7 @@
           <a:p>
             <a:fld id="{D06547AA-0C30-44EA-B66D-6D875D43B7DD}" type="datetimeFigureOut">
               <a:rPr lang="en-CA" smtClean="0"/>
-              <a:t>2021-06-27</a:t>
+              <a:t>2021-06-28</a:t>
             </a:fld>
             <a:endParaRPr lang="en-CA"/>
           </a:p>
@@ -15593,7 +15598,12 @@
             <p:ph idx="1"/>
           </p:nvPr>
         </p:nvSpPr>
-        <p:spPr/>
+        <p:spPr>
+          <a:xfrm>
+            <a:off x="3869268" y="864108"/>
+            <a:ext cx="7315200" cy="881565"/>
+          </a:xfrm>
+        </p:spPr>
         <p:txBody>
           <a:bodyPr/>
           <a:lstStyle/>
@@ -15606,6 +15616,189 @@
           </a:p>
         </p:txBody>
       </p:sp>
+      <p:graphicFrame>
+        <p:nvGraphicFramePr>
+          <p:cNvPr id="6" name="Table 5">
+            <a:extLst>
+              <a:ext uri="{FF2B5EF4-FFF2-40B4-BE49-F238E27FC236}">
+                <a16:creationId xmlns:a16="http://schemas.microsoft.com/office/drawing/2014/main" id="{56380310-DF31-4165-AE99-6BFCAA36970A}"/>
+              </a:ext>
+            </a:extLst>
+          </p:cNvPr>
+          <p:cNvGraphicFramePr>
+            <a:graphicFrameLocks noGrp="1"/>
+          </p:cNvGraphicFramePr>
+          <p:nvPr>
+            <p:extLst>
+              <p:ext uri="{D42A27DB-BD31-4B8C-83A1-F6EECF244321}">
+                <p14:modId xmlns:p14="http://schemas.microsoft.com/office/powerpoint/2010/main" val="1419848457"/>
+              </p:ext>
+            </p:extLst>
+          </p:nvPr>
+        </p:nvGraphicFramePr>
+        <p:xfrm>
+          <a:off x="3869268" y="1745673"/>
+          <a:ext cx="7315200" cy="675640"/>
+        </p:xfrm>
+        <a:graphic>
+          <a:graphicData uri="http://schemas.openxmlformats.org/drawingml/2006/table">
+            <a:tbl>
+              <a:tblPr/>
+              <a:tblGrid>
+                <a:gridCol w="7315200">
+                  <a:extLst>
+                    <a:ext uri="{9D8B030D-6E8A-4147-A177-3AD203B41FA5}">
+                      <a16:colId xmlns:a16="http://schemas.microsoft.com/office/drawing/2014/main" val="3183423037"/>
+                    </a:ext>
+                  </a:extLst>
+                </a:gridCol>
+              </a:tblGrid>
+              <a:tr h="0">
+                <a:tc>
+                  <a:txBody>
+                    <a:bodyPr/>
+                    <a:lstStyle/>
+                    <a:p>
+                      <a:pPr rtl="0" fontAlgn="t">
+                        <a:spcBef>
+                          <a:spcPts val="0"/>
+                        </a:spcBef>
+                        <a:spcAft>
+                          <a:spcPts val="0"/>
+                        </a:spcAft>
+                      </a:pPr>
+                      <a:r>
+                        <a:rPr lang="en-CA" sz="1800" b="0" i="0" u="none" strike="noStrike" dirty="0" err="1">
+                          <a:solidFill>
+                            <a:srgbClr val="929181"/>
+                          </a:solidFill>
+                          <a:effectLst/>
+                          <a:latin typeface="Consolas" panose="020B0609020204030204" pitchFamily="49" charset="0"/>
+                        </a:rPr>
+                        <a:t>pi@raspberrypi</a:t>
+                      </a:r>
+                      <a:r>
+                        <a:rPr lang="en-CA" sz="1800" b="0" i="0" u="none" strike="noStrike" dirty="0">
+                          <a:solidFill>
+                            <a:srgbClr val="929181"/>
+                          </a:solidFill>
+                          <a:effectLst/>
+                          <a:latin typeface="Consolas" panose="020B0609020204030204" pitchFamily="49" charset="0"/>
+                        </a:rPr>
+                        <a:t>:~/Project $ </a:t>
+                      </a:r>
+                      <a:r>
+                        <a:rPr lang="en-CA" sz="1800" b="0" i="0" u="none" strike="noStrike" dirty="0" err="1">
+                          <a:solidFill>
+                            <a:srgbClr val="929181"/>
+                          </a:solidFill>
+                          <a:effectLst/>
+                          <a:latin typeface="Consolas" panose="020B0609020204030204" pitchFamily="49" charset="0"/>
+                        </a:rPr>
+                        <a:t>gcc</a:t>
+                      </a:r>
+                      <a:r>
+                        <a:rPr lang="en-CA" sz="1800" b="0" i="0" u="none" strike="noStrike" dirty="0">
+                          <a:solidFill>
+                            <a:srgbClr val="929181"/>
+                          </a:solidFill>
+                          <a:effectLst/>
+                          <a:latin typeface="Consolas" panose="020B0609020204030204" pitchFamily="49" charset="0"/>
+                        </a:rPr>
+                        <a:t> -o LCD </a:t>
+                      </a:r>
+                      <a:r>
+                        <a:rPr lang="en-CA" sz="1800" b="0" i="0" u="none" strike="noStrike" dirty="0" err="1">
+                          <a:solidFill>
+                            <a:srgbClr val="929181"/>
+                          </a:solidFill>
+                          <a:effectLst/>
+                          <a:latin typeface="Consolas" panose="020B0609020204030204" pitchFamily="49" charset="0"/>
+                        </a:rPr>
+                        <a:t>lcd.c</a:t>
+                      </a:r>
+                      <a:r>
+                        <a:rPr lang="en-CA" sz="1800" b="0" i="0" u="none" strike="noStrike" dirty="0">
+                          <a:solidFill>
+                            <a:srgbClr val="929181"/>
+                          </a:solidFill>
+                          <a:effectLst/>
+                          <a:latin typeface="Consolas" panose="020B0609020204030204" pitchFamily="49" charset="0"/>
+                        </a:rPr>
+                        <a:t> -l </a:t>
+                      </a:r>
+                      <a:r>
+                        <a:rPr lang="en-CA" sz="1800" b="0" i="0" u="none" strike="noStrike" dirty="0" err="1">
+                          <a:solidFill>
+                            <a:srgbClr val="929181"/>
+                          </a:solidFill>
+                          <a:effectLst/>
+                          <a:latin typeface="Consolas" panose="020B0609020204030204" pitchFamily="49" charset="0"/>
+                        </a:rPr>
+                        <a:t>wiringPi</a:t>
+                      </a:r>
+                      <a:br>
+                        <a:rPr lang="en-CA" sz="1800" b="0" i="0" u="none" strike="noStrike" dirty="0">
+                          <a:solidFill>
+                            <a:srgbClr val="929181"/>
+                          </a:solidFill>
+                          <a:effectLst/>
+                          <a:latin typeface="Consolas" panose="020B0609020204030204" pitchFamily="49" charset="0"/>
+                        </a:rPr>
+                      </a:br>
+                      <a:r>
+                        <a:rPr lang="en-CA" sz="1800" b="0" i="0" u="none" strike="noStrike" dirty="0" err="1">
+                          <a:solidFill>
+                            <a:srgbClr val="929181"/>
+                          </a:solidFill>
+                          <a:effectLst/>
+                          <a:latin typeface="Consolas" panose="020B0609020204030204" pitchFamily="49" charset="0"/>
+                        </a:rPr>
+                        <a:t>pi@raspberrypi</a:t>
+                      </a:r>
+                      <a:r>
+                        <a:rPr lang="en-CA" sz="1800" b="0" i="0" u="none" strike="noStrike" dirty="0">
+                          <a:solidFill>
+                            <a:srgbClr val="929181"/>
+                          </a:solidFill>
+                          <a:effectLst/>
+                          <a:latin typeface="Consolas" panose="020B0609020204030204" pitchFamily="49" charset="0"/>
+                        </a:rPr>
+                        <a:t>:~/Project $</a:t>
+                      </a:r>
+                      <a:endParaRPr lang="en-CA" dirty="0">
+                        <a:effectLst/>
+                      </a:endParaRPr>
+                    </a:p>
+                  </a:txBody>
+                  <a:tcPr marL="63500" marR="63500" marT="63500" marB="63500">
+                    <a:lnL>
+                      <a:noFill/>
+                    </a:lnL>
+                    <a:lnR>
+                      <a:noFill/>
+                    </a:lnR>
+                    <a:lnT>
+                      <a:noFill/>
+                    </a:lnT>
+                    <a:lnB>
+                      <a:noFill/>
+                    </a:lnB>
+                    <a:solidFill>
+                      <a:srgbClr val="22221B"/>
+                    </a:solidFill>
+                  </a:tcPr>
+                </a:tc>
+                <a:extLst>
+                  <a:ext uri="{0D108BD9-81ED-4DB2-BD59-A6C34878D82A}">
+                    <a16:rowId xmlns:a16="http://schemas.microsoft.com/office/drawing/2014/main" val="3326427761"/>
+                  </a:ext>
+                </a:extLst>
+              </a:tr>
+            </a:tbl>
+          </a:graphicData>
+        </a:graphic>
+      </p:graphicFrame>
     </p:spTree>
     <p:extLst>
       <p:ext uri="{BB962C8B-B14F-4D97-AF65-F5344CB8AC3E}">

</xml_diff>